<commit_message>
update images for undo/redo
</commit_message>
<xml_diff>
--- a/docs/diagrams/UndoRedoActivityDiagram.pptx
+++ b/docs/diagrams/UndoRedoActivityDiagram.pptx
@@ -3335,8 +3335,18 @@
 </file>
 
 <file path=ppt/slides/slide1.xml><?xml version="1.0" encoding="utf-8"?>
-<p:sld xmlns:a="http://schemas.openxmlformats.org/drawingml/2006/main" xmlns:r="http://schemas.openxmlformats.org/officeDocument/2006/relationships" xmlns:p="http://schemas.openxmlformats.org/presentationml/2006/main">
+<p:sld xmlns:a="http://schemas.openxmlformats.org/drawingml/2006/main" xmlns:r="http://schemas.openxmlformats.org/officeDocument/2006/relationships" xmlns:p="http://schemas.openxmlformats.org/presentationml/2006/main" showMasterSp="0">
   <p:cSld>
+    <p:bg>
+      <p:bgPr>
+        <a:solidFill>
+          <a:schemeClr val="bg1">
+            <a:alpha val="0"/>
+          </a:schemeClr>
+        </a:solidFill>
+        <a:effectLst/>
+      </p:bgPr>
+    </p:bg>
     <p:spTree>
       <p:nvGrpSpPr>
         <p:cNvPr id="1" name=""/>
@@ -3660,15 +3670,7 @@
             </a:r>
             <a:r>
               <a:rPr lang="en-US" smtClean="0"/>
-              <a:t>book </a:t>
-            </a:r>
-            <a:r>
-              <a:rPr lang="en-US" smtClean="0"/>
-              <a:t>shelf</a:t>
-            </a:r>
-            <a:r>
-              <a:rPr lang="en-US" smtClean="0"/>
-              <a:t>]</a:t>
+              <a:t>book shelf]</a:t>
             </a:r>
             <a:endParaRPr lang="en-SG" sz="1801" dirty="0"/>
           </a:p>

</xml_diff>

<commit_message>
Removed address book from undo/redo
</commit_message>
<xml_diff>
--- a/docs/diagrams/UndoRedoActivityDiagram.pptx
+++ b/docs/diagrams/UndoRedoActivityDiagram.pptx
@@ -112,10 +112,6 @@
 </p:presentation>
 </file>
 
-<file path=ppt/revisionInfo.xml><?xml version="1.0" encoding="utf-8"?>
-<p1510:revInfo xmlns:a="http://schemas.openxmlformats.org/drawingml/2006/main" xmlns:r="http://schemas.openxmlformats.org/officeDocument/2006/relationships" xmlns:p1510="http://schemas.microsoft.com/office/powerpoint/2015/10/main"/>
-</file>
-
 <file path=ppt/slideLayouts/slideLayout1.xml><?xml version="1.0" encoding="utf-8"?>
 <p:sldLayout xmlns:a="http://schemas.openxmlformats.org/drawingml/2006/main" xmlns:r="http://schemas.openxmlformats.org/officeDocument/2006/relationships" xmlns:p="http://schemas.openxmlformats.org/presentationml/2006/main" type="title" preserve="1">
   <p:cSld name="Title Slide">
@@ -265,7 +261,7 @@
           <a:p>
             <a:fld id="{542F47FF-5056-41FF-A1F8-23A414798AA4}" type="datetimeFigureOut">
               <a:rPr lang="en-SG" smtClean="0"/>
-              <a:t>6/7/2018</a:t>
+              <a:t>20/3/19</a:t>
             </a:fld>
             <a:endParaRPr lang="en-SG"/>
           </a:p>
@@ -465,7 +461,7 @@
           <a:p>
             <a:fld id="{542F47FF-5056-41FF-A1F8-23A414798AA4}" type="datetimeFigureOut">
               <a:rPr lang="en-SG" smtClean="0"/>
-              <a:t>6/7/2018</a:t>
+              <a:t>20/3/19</a:t>
             </a:fld>
             <a:endParaRPr lang="en-SG"/>
           </a:p>
@@ -675,7 +671,7 @@
           <a:p>
             <a:fld id="{542F47FF-5056-41FF-A1F8-23A414798AA4}" type="datetimeFigureOut">
               <a:rPr lang="en-SG" smtClean="0"/>
-              <a:t>6/7/2018</a:t>
+              <a:t>20/3/19</a:t>
             </a:fld>
             <a:endParaRPr lang="en-SG"/>
           </a:p>
@@ -875,7 +871,7 @@
           <a:p>
             <a:fld id="{542F47FF-5056-41FF-A1F8-23A414798AA4}" type="datetimeFigureOut">
               <a:rPr lang="en-SG" smtClean="0"/>
-              <a:t>6/7/2018</a:t>
+              <a:t>20/3/19</a:t>
             </a:fld>
             <a:endParaRPr lang="en-SG"/>
           </a:p>
@@ -1151,7 +1147,7 @@
           <a:p>
             <a:fld id="{542F47FF-5056-41FF-A1F8-23A414798AA4}" type="datetimeFigureOut">
               <a:rPr lang="en-SG" smtClean="0"/>
-              <a:t>6/7/2018</a:t>
+              <a:t>20/3/19</a:t>
             </a:fld>
             <a:endParaRPr lang="en-SG"/>
           </a:p>
@@ -1419,7 +1415,7 @@
           <a:p>
             <a:fld id="{542F47FF-5056-41FF-A1F8-23A414798AA4}" type="datetimeFigureOut">
               <a:rPr lang="en-SG" smtClean="0"/>
-              <a:t>6/7/2018</a:t>
+              <a:t>20/3/19</a:t>
             </a:fld>
             <a:endParaRPr lang="en-SG"/>
           </a:p>
@@ -1834,7 +1830,7 @@
           <a:p>
             <a:fld id="{542F47FF-5056-41FF-A1F8-23A414798AA4}" type="datetimeFigureOut">
               <a:rPr lang="en-SG" smtClean="0"/>
-              <a:t>6/7/2018</a:t>
+              <a:t>20/3/19</a:t>
             </a:fld>
             <a:endParaRPr lang="en-SG"/>
           </a:p>
@@ -1976,7 +1972,7 @@
           <a:p>
             <a:fld id="{542F47FF-5056-41FF-A1F8-23A414798AA4}" type="datetimeFigureOut">
               <a:rPr lang="en-SG" smtClean="0"/>
-              <a:t>6/7/2018</a:t>
+              <a:t>20/3/19</a:t>
             </a:fld>
             <a:endParaRPr lang="en-SG"/>
           </a:p>
@@ -2089,7 +2085,7 @@
           <a:p>
             <a:fld id="{542F47FF-5056-41FF-A1F8-23A414798AA4}" type="datetimeFigureOut">
               <a:rPr lang="en-SG" smtClean="0"/>
-              <a:t>6/7/2018</a:t>
+              <a:t>20/3/19</a:t>
             </a:fld>
             <a:endParaRPr lang="en-SG"/>
           </a:p>
@@ -2402,7 +2398,7 @@
           <a:p>
             <a:fld id="{542F47FF-5056-41FF-A1F8-23A414798AA4}" type="datetimeFigureOut">
               <a:rPr lang="en-SG" smtClean="0"/>
-              <a:t>6/7/2018</a:t>
+              <a:t>20/3/19</a:t>
             </a:fld>
             <a:endParaRPr lang="en-SG"/>
           </a:p>
@@ -2691,7 +2687,7 @@
           <a:p>
             <a:fld id="{542F47FF-5056-41FF-A1F8-23A414798AA4}" type="datetimeFigureOut">
               <a:rPr lang="en-SG" smtClean="0"/>
-              <a:t>6/7/2018</a:t>
+              <a:t>20/3/19</a:t>
             </a:fld>
             <a:endParaRPr lang="en-SG"/>
           </a:p>
@@ -2934,7 +2930,7 @@
           <a:p>
             <a:fld id="{542F47FF-5056-41FF-A1F8-23A414798AA4}" type="datetimeFigureOut">
               <a:rPr lang="en-SG" smtClean="0"/>
-              <a:t>6/7/2018</a:t>
+              <a:t>20/3/19</a:t>
             </a:fld>
             <a:endParaRPr lang="en-SG"/>
           </a:p>
@@ -3636,8 +3632,8 @@
         </p:nvSpPr>
         <p:spPr>
           <a:xfrm>
-            <a:off x="4412106" y="2102568"/>
-            <a:ext cx="2066045" cy="646587"/>
+            <a:off x="4202312" y="1910082"/>
+            <a:ext cx="2066045" cy="923458"/>
           </a:xfrm>
           <a:prstGeom prst="rect">
             <a:avLst/>
@@ -3656,7 +3652,7 @@
             </a:r>
             <a:r>
               <a:rPr lang="en-US" dirty="0"/>
-              <a:t>command commits address book]</a:t>
+              <a:t>command commits  hotel management system]</a:t>
             </a:r>
             <a:endParaRPr lang="en-SG" sz="1801" dirty="0"/>
           </a:p>
@@ -3676,8 +3672,8 @@
         </p:nvSpPr>
         <p:spPr>
           <a:xfrm>
-            <a:off x="6478151" y="2438400"/>
-            <a:ext cx="2953232" cy="814659"/>
+            <a:off x="6237767" y="2311019"/>
+            <a:ext cx="3568526" cy="814659"/>
           </a:xfrm>
           <a:prstGeom prst="roundRect">
             <a:avLst/>
@@ -3709,11 +3705,11 @@
             <a:pPr algn="ctr"/>
             <a:r>
               <a:rPr lang="en-SG" sz="1801" dirty="0"/>
-              <a:t>Purge redundant states and then save address book to </a:t>
+              <a:t>Purge redundant states and then save hotel management system to </a:t>
             </a:r>
             <a:r>
               <a:rPr lang="en-SG" sz="1801" dirty="0" err="1"/>
-              <a:t>addressBookStateList</a:t>
+              <a:t>hotelManagementSystemStateList</a:t>
             </a:r>
             <a:r>
               <a:rPr lang="en-SG" sz="1801" dirty="0"/>
@@ -3940,14 +3936,16 @@
         <p:nvCxnSpPr>
           <p:cNvPr id="66" name="Elbow Connector 65"/>
           <p:cNvCxnSpPr>
+            <a:cxnSpLocks/>
             <a:stCxn id="56" idx="0"/>
+            <a:endCxn id="51" idx="1"/>
           </p:cNvCxnSpPr>
           <p:nvPr/>
         </p:nvCxnSpPr>
         <p:spPr>
           <a:xfrm rot="5400000" flipH="1" flipV="1">
-            <a:off x="6123581" y="2716584"/>
-            <a:ext cx="229667" cy="482060"/>
+            <a:off x="5940526" y="2775207"/>
+            <a:ext cx="354098" cy="240383"/>
           </a:xfrm>
           <a:prstGeom prst="bentConnector2">
             <a:avLst/>
@@ -4013,6 +4011,7 @@
         <p:nvCxnSpPr>
           <p:cNvPr id="74" name="Elbow Connector 73"/>
           <p:cNvCxnSpPr>
+            <a:cxnSpLocks/>
             <a:stCxn id="51" idx="3"/>
             <a:endCxn id="46" idx="0"/>
           </p:cNvCxnSpPr>
@@ -4020,8 +4019,8 @@
         </p:nvCxnSpPr>
         <p:spPr>
           <a:xfrm>
-            <a:off x="9431383" y="2845730"/>
-            <a:ext cx="459678" cy="229667"/>
+            <a:off x="9806293" y="2718349"/>
+            <a:ext cx="84768" cy="357048"/>
           </a:xfrm>
           <a:prstGeom prst="bentConnector2">
             <a:avLst/>

</xml_diff>

<commit_message>
Corrected diagrams for undo/redo feature implementation.
</commit_message>
<xml_diff>
--- a/docs/diagrams/UndoRedoActivityDiagram.pptx
+++ b/docs/diagrams/UndoRedoActivityDiagram.pptx
@@ -261,7 +261,7 @@
           <a:p>
             <a:fld id="{542F47FF-5056-41FF-A1F8-23A414798AA4}" type="datetimeFigureOut">
               <a:rPr lang="en-SG" smtClean="0"/>
-              <a:t>20/3/19</a:t>
+              <a:t>21/3/19</a:t>
             </a:fld>
             <a:endParaRPr lang="en-SG"/>
           </a:p>
@@ -461,7 +461,7 @@
           <a:p>
             <a:fld id="{542F47FF-5056-41FF-A1F8-23A414798AA4}" type="datetimeFigureOut">
               <a:rPr lang="en-SG" smtClean="0"/>
-              <a:t>20/3/19</a:t>
+              <a:t>21/3/19</a:t>
             </a:fld>
             <a:endParaRPr lang="en-SG"/>
           </a:p>
@@ -671,7 +671,7 @@
           <a:p>
             <a:fld id="{542F47FF-5056-41FF-A1F8-23A414798AA4}" type="datetimeFigureOut">
               <a:rPr lang="en-SG" smtClean="0"/>
-              <a:t>20/3/19</a:t>
+              <a:t>21/3/19</a:t>
             </a:fld>
             <a:endParaRPr lang="en-SG"/>
           </a:p>
@@ -871,7 +871,7 @@
           <a:p>
             <a:fld id="{542F47FF-5056-41FF-A1F8-23A414798AA4}" type="datetimeFigureOut">
               <a:rPr lang="en-SG" smtClean="0"/>
-              <a:t>20/3/19</a:t>
+              <a:t>21/3/19</a:t>
             </a:fld>
             <a:endParaRPr lang="en-SG"/>
           </a:p>
@@ -1147,7 +1147,7 @@
           <a:p>
             <a:fld id="{542F47FF-5056-41FF-A1F8-23A414798AA4}" type="datetimeFigureOut">
               <a:rPr lang="en-SG" smtClean="0"/>
-              <a:t>20/3/19</a:t>
+              <a:t>21/3/19</a:t>
             </a:fld>
             <a:endParaRPr lang="en-SG"/>
           </a:p>
@@ -1415,7 +1415,7 @@
           <a:p>
             <a:fld id="{542F47FF-5056-41FF-A1F8-23A414798AA4}" type="datetimeFigureOut">
               <a:rPr lang="en-SG" smtClean="0"/>
-              <a:t>20/3/19</a:t>
+              <a:t>21/3/19</a:t>
             </a:fld>
             <a:endParaRPr lang="en-SG"/>
           </a:p>
@@ -1830,7 +1830,7 @@
           <a:p>
             <a:fld id="{542F47FF-5056-41FF-A1F8-23A414798AA4}" type="datetimeFigureOut">
               <a:rPr lang="en-SG" smtClean="0"/>
-              <a:t>20/3/19</a:t>
+              <a:t>21/3/19</a:t>
             </a:fld>
             <a:endParaRPr lang="en-SG"/>
           </a:p>
@@ -1972,7 +1972,7 @@
           <a:p>
             <a:fld id="{542F47FF-5056-41FF-A1F8-23A414798AA4}" type="datetimeFigureOut">
               <a:rPr lang="en-SG" smtClean="0"/>
-              <a:t>20/3/19</a:t>
+              <a:t>21/3/19</a:t>
             </a:fld>
             <a:endParaRPr lang="en-SG"/>
           </a:p>
@@ -2085,7 +2085,7 @@
           <a:p>
             <a:fld id="{542F47FF-5056-41FF-A1F8-23A414798AA4}" type="datetimeFigureOut">
               <a:rPr lang="en-SG" smtClean="0"/>
-              <a:t>20/3/19</a:t>
+              <a:t>21/3/19</a:t>
             </a:fld>
             <a:endParaRPr lang="en-SG"/>
           </a:p>
@@ -2398,7 +2398,7 @@
           <a:p>
             <a:fld id="{542F47FF-5056-41FF-A1F8-23A414798AA4}" type="datetimeFigureOut">
               <a:rPr lang="en-SG" smtClean="0"/>
-              <a:t>20/3/19</a:t>
+              <a:t>21/3/19</a:t>
             </a:fld>
             <a:endParaRPr lang="en-SG"/>
           </a:p>
@@ -2687,7 +2687,7 @@
           <a:p>
             <a:fld id="{542F47FF-5056-41FF-A1F8-23A414798AA4}" type="datetimeFigureOut">
               <a:rPr lang="en-SG" smtClean="0"/>
-              <a:t>20/3/19</a:t>
+              <a:t>21/3/19</a:t>
             </a:fld>
             <a:endParaRPr lang="en-SG"/>
           </a:p>
@@ -2930,7 +2930,7 @@
           <a:p>
             <a:fld id="{542F47FF-5056-41FF-A1F8-23A414798AA4}" type="datetimeFigureOut">
               <a:rPr lang="en-SG" smtClean="0"/>
-              <a:t>20/3/19</a:t>
+              <a:t>21/3/19</a:t>
             </a:fld>
             <a:endParaRPr lang="en-SG"/>
           </a:p>
@@ -3705,15 +3705,7 @@
             <a:pPr algn="ctr"/>
             <a:r>
               <a:rPr lang="en-SG" sz="1801" dirty="0"/>
-              <a:t>Purge redundant states and then save hotel management system to </a:t>
-            </a:r>
-            <a:r>
-              <a:rPr lang="en-SG" sz="1801" dirty="0" err="1"/>
-              <a:t>hotelManagementSystemStateList</a:t>
-            </a:r>
-            <a:r>
-              <a:rPr lang="en-SG" sz="1801" dirty="0"/>
-              <a:t> </a:t>
+              <a:t>Purge redundant states and then save hotel management system to hotelManagementSystemStateList </a:t>
             </a:r>
           </a:p>
         </p:txBody>

</xml_diff>

<commit_message>
Dev guide and minor changes
</commit_message>
<xml_diff>
--- a/docs/diagrams/UndoRedoActivityDiagram.pptx
+++ b/docs/diagrams/UndoRedoActivityDiagram.pptx
@@ -112,10 +112,6 @@
 </p:presentation>
 </file>
 
-<file path=ppt/revisionInfo.xml><?xml version="1.0" encoding="utf-8"?>
-<p1510:revInfo xmlns:a="http://schemas.openxmlformats.org/drawingml/2006/main" xmlns:r="http://schemas.openxmlformats.org/officeDocument/2006/relationships" xmlns:p1510="http://schemas.microsoft.com/office/powerpoint/2015/10/main"/>
-</file>
-
 <file path=ppt/slideLayouts/slideLayout1.xml><?xml version="1.0" encoding="utf-8"?>
 <p:sldLayout xmlns:a="http://schemas.openxmlformats.org/drawingml/2006/main" xmlns:r="http://schemas.openxmlformats.org/officeDocument/2006/relationships" xmlns:p="http://schemas.openxmlformats.org/presentationml/2006/main" type="title" preserve="1">
   <p:cSld name="Title Slide">
@@ -265,7 +261,7 @@
           <a:p>
             <a:fld id="{542F47FF-5056-41FF-A1F8-23A414798AA4}" type="datetimeFigureOut">
               <a:rPr lang="en-SG" smtClean="0"/>
-              <a:t>6/7/2018</a:t>
+              <a:t>31/3/2019</a:t>
             </a:fld>
             <a:endParaRPr lang="en-SG"/>
           </a:p>
@@ -465,7 +461,7 @@
           <a:p>
             <a:fld id="{542F47FF-5056-41FF-A1F8-23A414798AA4}" type="datetimeFigureOut">
               <a:rPr lang="en-SG" smtClean="0"/>
-              <a:t>6/7/2018</a:t>
+              <a:t>31/3/2019</a:t>
             </a:fld>
             <a:endParaRPr lang="en-SG"/>
           </a:p>
@@ -675,7 +671,7 @@
           <a:p>
             <a:fld id="{542F47FF-5056-41FF-A1F8-23A414798AA4}" type="datetimeFigureOut">
               <a:rPr lang="en-SG" smtClean="0"/>
-              <a:t>6/7/2018</a:t>
+              <a:t>31/3/2019</a:t>
             </a:fld>
             <a:endParaRPr lang="en-SG"/>
           </a:p>
@@ -875,7 +871,7 @@
           <a:p>
             <a:fld id="{542F47FF-5056-41FF-A1F8-23A414798AA4}" type="datetimeFigureOut">
               <a:rPr lang="en-SG" smtClean="0"/>
-              <a:t>6/7/2018</a:t>
+              <a:t>31/3/2019</a:t>
             </a:fld>
             <a:endParaRPr lang="en-SG"/>
           </a:p>
@@ -1151,7 +1147,7 @@
           <a:p>
             <a:fld id="{542F47FF-5056-41FF-A1F8-23A414798AA4}" type="datetimeFigureOut">
               <a:rPr lang="en-SG" smtClean="0"/>
-              <a:t>6/7/2018</a:t>
+              <a:t>31/3/2019</a:t>
             </a:fld>
             <a:endParaRPr lang="en-SG"/>
           </a:p>
@@ -1419,7 +1415,7 @@
           <a:p>
             <a:fld id="{542F47FF-5056-41FF-A1F8-23A414798AA4}" type="datetimeFigureOut">
               <a:rPr lang="en-SG" smtClean="0"/>
-              <a:t>6/7/2018</a:t>
+              <a:t>31/3/2019</a:t>
             </a:fld>
             <a:endParaRPr lang="en-SG"/>
           </a:p>
@@ -1834,7 +1830,7 @@
           <a:p>
             <a:fld id="{542F47FF-5056-41FF-A1F8-23A414798AA4}" type="datetimeFigureOut">
               <a:rPr lang="en-SG" smtClean="0"/>
-              <a:t>6/7/2018</a:t>
+              <a:t>31/3/2019</a:t>
             </a:fld>
             <a:endParaRPr lang="en-SG"/>
           </a:p>
@@ -1976,7 +1972,7 @@
           <a:p>
             <a:fld id="{542F47FF-5056-41FF-A1F8-23A414798AA4}" type="datetimeFigureOut">
               <a:rPr lang="en-SG" smtClean="0"/>
-              <a:t>6/7/2018</a:t>
+              <a:t>31/3/2019</a:t>
             </a:fld>
             <a:endParaRPr lang="en-SG"/>
           </a:p>
@@ -2089,7 +2085,7 @@
           <a:p>
             <a:fld id="{542F47FF-5056-41FF-A1F8-23A414798AA4}" type="datetimeFigureOut">
               <a:rPr lang="en-SG" smtClean="0"/>
-              <a:t>6/7/2018</a:t>
+              <a:t>31/3/2019</a:t>
             </a:fld>
             <a:endParaRPr lang="en-SG"/>
           </a:p>
@@ -2402,7 +2398,7 @@
           <a:p>
             <a:fld id="{542F47FF-5056-41FF-A1F8-23A414798AA4}" type="datetimeFigureOut">
               <a:rPr lang="en-SG" smtClean="0"/>
-              <a:t>6/7/2018</a:t>
+              <a:t>31/3/2019</a:t>
             </a:fld>
             <a:endParaRPr lang="en-SG"/>
           </a:p>
@@ -2691,7 +2687,7 @@
           <a:p>
             <a:fld id="{542F47FF-5056-41FF-A1F8-23A414798AA4}" type="datetimeFigureOut">
               <a:rPr lang="en-SG" smtClean="0"/>
-              <a:t>6/7/2018</a:t>
+              <a:t>31/3/2019</a:t>
             </a:fld>
             <a:endParaRPr lang="en-SG"/>
           </a:p>
@@ -2934,7 +2930,7 @@
           <a:p>
             <a:fld id="{542F47FF-5056-41FF-A1F8-23A414798AA4}" type="datetimeFigureOut">
               <a:rPr lang="en-SG" smtClean="0"/>
-              <a:t>6/7/2018</a:t>
+              <a:t>31/3/2019</a:t>
             </a:fld>
             <a:endParaRPr lang="en-SG"/>
           </a:p>
@@ -3458,7 +3454,7 @@
         <p:spPr>
           <a:xfrm>
             <a:off x="3143315" y="2957561"/>
-            <a:ext cx="1570355" cy="716437"/>
+            <a:ext cx="1703893" cy="716437"/>
           </a:xfrm>
           <a:prstGeom prst="roundRect">
             <a:avLst/>
@@ -3490,7 +3486,7 @@
             <a:pPr algn="ctr"/>
             <a:r>
               <a:rPr lang="en-SG" sz="1801" dirty="0"/>
-              <a:t>User executes command</a:t>
+              <a:t>User executes Transformation</a:t>
             </a:r>
           </a:p>
         </p:txBody>
@@ -3513,8 +3509,8 @@
         </p:nvCxnSpPr>
         <p:spPr>
           <a:xfrm flipV="1">
-            <a:off x="4713670" y="3312830"/>
-            <a:ext cx="1043331" cy="2950"/>
+            <a:off x="4847208" y="3312830"/>
+            <a:ext cx="909793" cy="2950"/>
           </a:xfrm>
           <a:prstGeom prst="straightConnector1">
             <a:avLst/>
@@ -3637,7 +3633,7 @@
         <p:spPr>
           <a:xfrm>
             <a:off x="4412106" y="2102568"/>
-            <a:ext cx="2066045" cy="646587"/>
+            <a:ext cx="2066045" cy="646459"/>
           </a:xfrm>
           <a:prstGeom prst="rect">
             <a:avLst/>
@@ -3656,7 +3652,7 @@
             </a:r>
             <a:r>
               <a:rPr lang="en-US" dirty="0"/>
-              <a:t>command commits address book]</a:t>
+              <a:t>command is added to history]</a:t>
             </a:r>
             <a:endParaRPr lang="en-SG" sz="1801" dirty="0"/>
           </a:p>
@@ -3709,15 +3705,7 @@
             <a:pPr algn="ctr"/>
             <a:r>
               <a:rPr lang="en-SG" sz="1801" dirty="0"/>
-              <a:t>Purge redundant states and then save address book to </a:t>
-            </a:r>
-            <a:r>
-              <a:rPr lang="en-SG" sz="1801" dirty="0" err="1"/>
-              <a:t>addressBookStateList</a:t>
-            </a:r>
-            <a:r>
-              <a:rPr lang="en-SG" sz="1801" dirty="0"/>
-              <a:t> </a:t>
+              <a:t>Purge redundant commands then shifts index accordingly</a:t>
             </a:r>
           </a:p>
         </p:txBody>

</xml_diff>

<commit_message>
DG: updated sections before documentation
</commit_message>
<xml_diff>
--- a/docs/diagrams/UndoRedoActivityDiagram.pptx
+++ b/docs/diagrams/UndoRedoActivityDiagram.pptx
@@ -112,10 +112,6 @@
 </p:presentation>
 </file>
 
-<file path=ppt/revisionInfo.xml><?xml version="1.0" encoding="utf-8"?>
-<p1510:revInfo xmlns:a="http://schemas.openxmlformats.org/drawingml/2006/main" xmlns:r="http://schemas.openxmlformats.org/officeDocument/2006/relationships" xmlns:p1510="http://schemas.microsoft.com/office/powerpoint/2015/10/main"/>
-</file>
-
 <file path=ppt/slideLayouts/slideLayout1.xml><?xml version="1.0" encoding="utf-8"?>
 <p:sldLayout xmlns:a="http://schemas.openxmlformats.org/drawingml/2006/main" xmlns:r="http://schemas.openxmlformats.org/officeDocument/2006/relationships" xmlns:p="http://schemas.openxmlformats.org/presentationml/2006/main" type="title" preserve="1">
   <p:cSld name="Title Slide">
@@ -265,7 +261,7 @@
           <a:p>
             <a:fld id="{542F47FF-5056-41FF-A1F8-23A414798AA4}" type="datetimeFigureOut">
               <a:rPr lang="en-SG" smtClean="0"/>
-              <a:t>6/7/2018</a:t>
+              <a:t>1/4/2019</a:t>
             </a:fld>
             <a:endParaRPr lang="en-SG"/>
           </a:p>
@@ -465,7 +461,7 @@
           <a:p>
             <a:fld id="{542F47FF-5056-41FF-A1F8-23A414798AA4}" type="datetimeFigureOut">
               <a:rPr lang="en-SG" smtClean="0"/>
-              <a:t>6/7/2018</a:t>
+              <a:t>1/4/2019</a:t>
             </a:fld>
             <a:endParaRPr lang="en-SG"/>
           </a:p>
@@ -675,7 +671,7 @@
           <a:p>
             <a:fld id="{542F47FF-5056-41FF-A1F8-23A414798AA4}" type="datetimeFigureOut">
               <a:rPr lang="en-SG" smtClean="0"/>
-              <a:t>6/7/2018</a:t>
+              <a:t>1/4/2019</a:t>
             </a:fld>
             <a:endParaRPr lang="en-SG"/>
           </a:p>
@@ -875,7 +871,7 @@
           <a:p>
             <a:fld id="{542F47FF-5056-41FF-A1F8-23A414798AA4}" type="datetimeFigureOut">
               <a:rPr lang="en-SG" smtClean="0"/>
-              <a:t>6/7/2018</a:t>
+              <a:t>1/4/2019</a:t>
             </a:fld>
             <a:endParaRPr lang="en-SG"/>
           </a:p>
@@ -1151,7 +1147,7 @@
           <a:p>
             <a:fld id="{542F47FF-5056-41FF-A1F8-23A414798AA4}" type="datetimeFigureOut">
               <a:rPr lang="en-SG" smtClean="0"/>
-              <a:t>6/7/2018</a:t>
+              <a:t>1/4/2019</a:t>
             </a:fld>
             <a:endParaRPr lang="en-SG"/>
           </a:p>
@@ -1419,7 +1415,7 @@
           <a:p>
             <a:fld id="{542F47FF-5056-41FF-A1F8-23A414798AA4}" type="datetimeFigureOut">
               <a:rPr lang="en-SG" smtClean="0"/>
-              <a:t>6/7/2018</a:t>
+              <a:t>1/4/2019</a:t>
             </a:fld>
             <a:endParaRPr lang="en-SG"/>
           </a:p>
@@ -1834,7 +1830,7 @@
           <a:p>
             <a:fld id="{542F47FF-5056-41FF-A1F8-23A414798AA4}" type="datetimeFigureOut">
               <a:rPr lang="en-SG" smtClean="0"/>
-              <a:t>6/7/2018</a:t>
+              <a:t>1/4/2019</a:t>
             </a:fld>
             <a:endParaRPr lang="en-SG"/>
           </a:p>
@@ -1976,7 +1972,7 @@
           <a:p>
             <a:fld id="{542F47FF-5056-41FF-A1F8-23A414798AA4}" type="datetimeFigureOut">
               <a:rPr lang="en-SG" smtClean="0"/>
-              <a:t>6/7/2018</a:t>
+              <a:t>1/4/2019</a:t>
             </a:fld>
             <a:endParaRPr lang="en-SG"/>
           </a:p>
@@ -2089,7 +2085,7 @@
           <a:p>
             <a:fld id="{542F47FF-5056-41FF-A1F8-23A414798AA4}" type="datetimeFigureOut">
               <a:rPr lang="en-SG" smtClean="0"/>
-              <a:t>6/7/2018</a:t>
+              <a:t>1/4/2019</a:t>
             </a:fld>
             <a:endParaRPr lang="en-SG"/>
           </a:p>
@@ -2402,7 +2398,7 @@
           <a:p>
             <a:fld id="{542F47FF-5056-41FF-A1F8-23A414798AA4}" type="datetimeFigureOut">
               <a:rPr lang="en-SG" smtClean="0"/>
-              <a:t>6/7/2018</a:t>
+              <a:t>1/4/2019</a:t>
             </a:fld>
             <a:endParaRPr lang="en-SG"/>
           </a:p>
@@ -2691,7 +2687,7 @@
           <a:p>
             <a:fld id="{542F47FF-5056-41FF-A1F8-23A414798AA4}" type="datetimeFigureOut">
               <a:rPr lang="en-SG" smtClean="0"/>
-              <a:t>6/7/2018</a:t>
+              <a:t>1/4/2019</a:t>
             </a:fld>
             <a:endParaRPr lang="en-SG"/>
           </a:p>
@@ -2934,7 +2930,7 @@
           <a:p>
             <a:fld id="{542F47FF-5056-41FF-A1F8-23A414798AA4}" type="datetimeFigureOut">
               <a:rPr lang="en-SG" smtClean="0"/>
-              <a:t>6/7/2018</a:t>
+              <a:t>1/4/2019</a:t>
             </a:fld>
             <a:endParaRPr lang="en-SG"/>
           </a:p>
@@ -3656,7 +3652,7 @@
             </a:r>
             <a:r>
               <a:rPr lang="en-US" dirty="0"/>
-              <a:t>command commits address book]</a:t>
+              <a:t>command commits finance tracker]</a:t>
             </a:r>
             <a:endParaRPr lang="en-SG" sz="1801" dirty="0"/>
           </a:p>
@@ -3709,11 +3705,11 @@
             <a:pPr algn="ctr"/>
             <a:r>
               <a:rPr lang="en-SG" sz="1801" dirty="0"/>
-              <a:t>Purge redundant states and then save address book to </a:t>
+              <a:t>Purge redundant states and then save finance tracker to </a:t>
             </a:r>
             <a:r>
               <a:rPr lang="en-SG" sz="1801" dirty="0" err="1"/>
-              <a:t>addressBookStateList</a:t>
+              <a:t>financeTrackerStateList</a:t>
             </a:r>
             <a:r>
               <a:rPr lang="en-SG" sz="1801" dirty="0"/>

</xml_diff>